<commit_message>
Correção código game mania
</commit_message>
<xml_diff>
--- a/UC09_Codificação_para_Front_End/SA2 - Encontro Remoto 5/GameMania_Vander.pptx
+++ b/UC09_Codificação_para_Front_End/SA2 - Encontro Remoto 5/GameMania_Vander.pptx
@@ -123,7 +123,7 @@
   </p:defaultTextStyle>
   <p:extLst>
     <p:ext uri="{EFAFB233-063F-42B5-8137-9DF3F51BA10A}">
-      <p15:sldGuideLst xmlns:p15="http://schemas.microsoft.com/office/powerpoint/2012/main" xmlns=""/>
+      <p15:sldGuideLst xmlns="" xmlns:p15="http://schemas.microsoft.com/office/powerpoint/2012/main"/>
     </p:ext>
   </p:extLst>
 </p:presentation>
@@ -381,7 +381,7 @@
     </p:spTree>
     <p:extLst>
       <p:ext uri="{BB962C8B-B14F-4D97-AF65-F5344CB8AC3E}">
-        <p14:creationId xmlns:p14="http://schemas.microsoft.com/office/powerpoint/2010/main" xmlns="" val="1960856101"/>
+        <p14:creationId xmlns="" xmlns:p14="http://schemas.microsoft.com/office/powerpoint/2010/main" val="1960856101"/>
       </p:ext>
     </p:extLst>
   </p:cSld>
@@ -665,7 +665,7 @@
     </p:spTree>
     <p:extLst>
       <p:ext uri="{BB962C8B-B14F-4D97-AF65-F5344CB8AC3E}">
-        <p14:creationId xmlns:p14="http://schemas.microsoft.com/office/powerpoint/2010/main" xmlns="" val="3260979146"/>
+        <p14:creationId xmlns="" xmlns:p14="http://schemas.microsoft.com/office/powerpoint/2010/main" val="3260979146"/>
       </p:ext>
     </p:extLst>
   </p:cSld>
@@ -837,7 +837,7 @@
     </p:spTree>
     <p:extLst>
       <p:ext uri="{BB962C8B-B14F-4D97-AF65-F5344CB8AC3E}">
-        <p14:creationId xmlns:p14="http://schemas.microsoft.com/office/powerpoint/2010/main" xmlns="" val="1798534047"/>
+        <p14:creationId xmlns="" xmlns:p14="http://schemas.microsoft.com/office/powerpoint/2010/main" val="1798534047"/>
       </p:ext>
     </p:extLst>
   </p:cSld>
@@ -1019,7 +1019,7 @@
     </p:spTree>
     <p:extLst>
       <p:ext uri="{BB962C8B-B14F-4D97-AF65-F5344CB8AC3E}">
-        <p14:creationId xmlns:p14="http://schemas.microsoft.com/office/powerpoint/2010/main" xmlns="" val="2406611249"/>
+        <p14:creationId xmlns="" xmlns:p14="http://schemas.microsoft.com/office/powerpoint/2010/main" val="2406611249"/>
       </p:ext>
     </p:extLst>
   </p:cSld>
@@ -1191,7 +1191,7 @@
     </p:spTree>
     <p:extLst>
       <p:ext uri="{BB962C8B-B14F-4D97-AF65-F5344CB8AC3E}">
-        <p14:creationId xmlns:p14="http://schemas.microsoft.com/office/powerpoint/2010/main" xmlns="" val="3805568220"/>
+        <p14:creationId xmlns="" xmlns:p14="http://schemas.microsoft.com/office/powerpoint/2010/main" val="3805568220"/>
       </p:ext>
     </p:extLst>
   </p:cSld>
@@ -1439,7 +1439,7 @@
     </p:spTree>
     <p:extLst>
       <p:ext uri="{BB962C8B-B14F-4D97-AF65-F5344CB8AC3E}">
-        <p14:creationId xmlns:p14="http://schemas.microsoft.com/office/powerpoint/2010/main" xmlns="" val="2250747918"/>
+        <p14:creationId xmlns="" xmlns:p14="http://schemas.microsoft.com/office/powerpoint/2010/main" val="2250747918"/>
       </p:ext>
     </p:extLst>
   </p:cSld>
@@ -1673,7 +1673,7 @@
     </p:spTree>
     <p:extLst>
       <p:ext uri="{BB962C8B-B14F-4D97-AF65-F5344CB8AC3E}">
-        <p14:creationId xmlns:p14="http://schemas.microsoft.com/office/powerpoint/2010/main" xmlns="" val="2223235357"/>
+        <p14:creationId xmlns="" xmlns:p14="http://schemas.microsoft.com/office/powerpoint/2010/main" val="2223235357"/>
       </p:ext>
     </p:extLst>
   </p:cSld>
@@ -2042,7 +2042,7 @@
     </p:spTree>
     <p:extLst>
       <p:ext uri="{BB962C8B-B14F-4D97-AF65-F5344CB8AC3E}">
-        <p14:creationId xmlns:p14="http://schemas.microsoft.com/office/powerpoint/2010/main" xmlns="" val="3629131634"/>
+        <p14:creationId xmlns="" xmlns:p14="http://schemas.microsoft.com/office/powerpoint/2010/main" val="3629131634"/>
       </p:ext>
     </p:extLst>
   </p:cSld>
@@ -2162,7 +2162,7 @@
     </p:spTree>
     <p:extLst>
       <p:ext uri="{BB962C8B-B14F-4D97-AF65-F5344CB8AC3E}">
-        <p14:creationId xmlns:p14="http://schemas.microsoft.com/office/powerpoint/2010/main" xmlns="" val="1595217743"/>
+        <p14:creationId xmlns="" xmlns:p14="http://schemas.microsoft.com/office/powerpoint/2010/main" val="1595217743"/>
       </p:ext>
     </p:extLst>
   </p:cSld>
@@ -2259,7 +2259,7 @@
     </p:spTree>
     <p:extLst>
       <p:ext uri="{BB962C8B-B14F-4D97-AF65-F5344CB8AC3E}">
-        <p14:creationId xmlns:p14="http://schemas.microsoft.com/office/powerpoint/2010/main" xmlns="" val="259170255"/>
+        <p14:creationId xmlns="" xmlns:p14="http://schemas.microsoft.com/office/powerpoint/2010/main" val="259170255"/>
       </p:ext>
     </p:extLst>
   </p:cSld>
@@ -2538,7 +2538,7 @@
     </p:spTree>
     <p:extLst>
       <p:ext uri="{BB962C8B-B14F-4D97-AF65-F5344CB8AC3E}">
-        <p14:creationId xmlns:p14="http://schemas.microsoft.com/office/powerpoint/2010/main" xmlns="" val="1811955283"/>
+        <p14:creationId xmlns="" xmlns:p14="http://schemas.microsoft.com/office/powerpoint/2010/main" val="1811955283"/>
       </p:ext>
     </p:extLst>
   </p:cSld>
@@ -2793,7 +2793,7 @@
     </p:spTree>
     <p:extLst>
       <p:ext uri="{BB962C8B-B14F-4D97-AF65-F5344CB8AC3E}">
-        <p14:creationId xmlns:p14="http://schemas.microsoft.com/office/powerpoint/2010/main" xmlns="" val="1253327629"/>
+        <p14:creationId xmlns="" xmlns:p14="http://schemas.microsoft.com/office/powerpoint/2010/main" val="1253327629"/>
       </p:ext>
     </p:extLst>
   </p:cSld>
@@ -3054,7 +3054,7 @@
     </p:spTree>
     <p:extLst>
       <p:ext uri="{BB962C8B-B14F-4D97-AF65-F5344CB8AC3E}">
-        <p14:creationId xmlns:p14="http://schemas.microsoft.com/office/powerpoint/2010/main" xmlns="" val="963955141"/>
+        <p14:creationId xmlns="" xmlns:p14="http://schemas.microsoft.com/office/powerpoint/2010/main" val="963955141"/>
       </p:ext>
     </p:extLst>
   </p:cSld>
@@ -3385,7 +3385,7 @@
           <p:cNvPr id="11" name="Título 1">
             <a:extLst>
               <a:ext uri="{FF2B5EF4-FFF2-40B4-BE49-F238E27FC236}">
-                <a16:creationId xmlns:a16="http://schemas.microsoft.com/office/drawing/2014/main" xmlns="" id="{AF25BD60-B88F-9418-7C60-522002041711}"/>
+                <a16:creationId xmlns="" xmlns:a16="http://schemas.microsoft.com/office/drawing/2014/main" id="{AF25BD60-B88F-9418-7C60-522002041711}"/>
               </a:ext>
             </a:extLst>
           </p:cNvPr>
@@ -3510,7 +3510,7 @@
           <p:cNvPr id="12" name="Subtítulo 2">
             <a:extLst>
               <a:ext uri="{FF2B5EF4-FFF2-40B4-BE49-F238E27FC236}">
-                <a16:creationId xmlns:a16="http://schemas.microsoft.com/office/drawing/2014/main" xmlns="" id="{E9306B26-74AD-604D-A293-40BC4D1A7E9D}"/>
+                <a16:creationId xmlns="" xmlns:a16="http://schemas.microsoft.com/office/drawing/2014/main" id="{E9306B26-74AD-604D-A293-40BC4D1A7E9D}"/>
               </a:ext>
             </a:extLst>
           </p:cNvPr>
@@ -3649,7 +3649,7 @@
     </p:spTree>
     <p:extLst>
       <p:ext uri="{BB962C8B-B14F-4D97-AF65-F5344CB8AC3E}">
-        <p14:creationId xmlns:p14="http://schemas.microsoft.com/office/powerpoint/2010/main" xmlns="" val="4294963567"/>
+        <p14:creationId xmlns="" xmlns:p14="http://schemas.microsoft.com/office/powerpoint/2010/main" val="4294963567"/>
       </p:ext>
     </p:extLst>
   </p:cSld>
@@ -3823,7 +3823,7 @@
     </p:spTree>
     <p:extLst>
       <p:ext uri="{BB962C8B-B14F-4D97-AF65-F5344CB8AC3E}">
-        <p14:creationId xmlns:p14="http://schemas.microsoft.com/office/powerpoint/2010/main" xmlns="" val="4294963567"/>
+        <p14:creationId xmlns="" xmlns:p14="http://schemas.microsoft.com/office/powerpoint/2010/main" val="4294963567"/>
       </p:ext>
     </p:extLst>
   </p:cSld>
@@ -4018,7 +4018,7 @@
     </p:spTree>
     <p:extLst>
       <p:ext uri="{BB962C8B-B14F-4D97-AF65-F5344CB8AC3E}">
-        <p14:creationId xmlns:p14="http://schemas.microsoft.com/office/powerpoint/2010/main" xmlns="" val="4294963567"/>
+        <p14:creationId xmlns="" xmlns:p14="http://schemas.microsoft.com/office/powerpoint/2010/main" val="4294963567"/>
       </p:ext>
     </p:extLst>
   </p:cSld>
@@ -4213,7 +4213,7 @@
     </p:spTree>
     <p:extLst>
       <p:ext uri="{BB962C8B-B14F-4D97-AF65-F5344CB8AC3E}">
-        <p14:creationId xmlns:p14="http://schemas.microsoft.com/office/powerpoint/2010/main" xmlns="" val="4294963567"/>
+        <p14:creationId xmlns="" xmlns:p14="http://schemas.microsoft.com/office/powerpoint/2010/main" val="4294963567"/>
       </p:ext>
     </p:extLst>
   </p:cSld>
@@ -4399,7 +4399,7 @@
     </p:spTree>
     <p:extLst>
       <p:ext uri="{BB962C8B-B14F-4D97-AF65-F5344CB8AC3E}">
-        <p14:creationId xmlns:p14="http://schemas.microsoft.com/office/powerpoint/2010/main" xmlns="" val="4294963567"/>
+        <p14:creationId xmlns="" xmlns:p14="http://schemas.microsoft.com/office/powerpoint/2010/main" val="4294963567"/>
       </p:ext>
     </p:extLst>
   </p:cSld>
@@ -4552,7 +4552,7 @@
       </p:sp>
       <p:pic>
         <p:nvPicPr>
-          <p:cNvPr id="11266" name="Picture 2"/>
+          <p:cNvPr id="1026" name="Picture 2"/>
           <p:cNvPicPr>
             <a:picLocks noChangeAspect="1" noChangeArrowheads="1"/>
           </p:cNvPicPr>
@@ -4567,8 +4567,8 @@
         </p:blipFill>
         <p:spPr bwMode="auto">
           <a:xfrm>
-            <a:off x="4380186" y="2544161"/>
-            <a:ext cx="3200400" cy="1790700"/>
+            <a:off x="6807747" y="1915182"/>
+            <a:ext cx="3600450" cy="2838450"/>
           </a:xfrm>
           <a:prstGeom prst="rect">
             <a:avLst/>
@@ -4582,10 +4582,42 @@
           </a:ln>
         </p:spPr>
       </p:pic>
+      <p:pic>
+        <p:nvPicPr>
+          <p:cNvPr id="1027" name="Picture 3"/>
+          <p:cNvPicPr>
+            <a:picLocks noChangeAspect="1" noChangeArrowheads="1"/>
+          </p:cNvPicPr>
+          <p:nvPr/>
+        </p:nvPicPr>
+        <p:blipFill>
+          <a:blip r:embed="rId3" cstate="print"/>
+          <a:srcRect/>
+          <a:stretch>
+            <a:fillRect/>
+          </a:stretch>
+        </p:blipFill>
+        <p:spPr bwMode="auto">
+          <a:xfrm>
+            <a:off x="1673937" y="1963791"/>
+            <a:ext cx="4219575" cy="2762250"/>
+          </a:xfrm>
+          <a:prstGeom prst="rect">
+            <a:avLst/>
+          </a:prstGeom>
+          <a:noFill/>
+          <a:ln w="9525">
+            <a:noFill/>
+            <a:miter lim="800000"/>
+            <a:headEnd/>
+            <a:tailEnd/>
+          </a:ln>
+        </p:spPr>
+      </p:pic>
     </p:spTree>
     <p:extLst>
       <p:ext uri="{BB962C8B-B14F-4D97-AF65-F5344CB8AC3E}">
-        <p14:creationId xmlns:p14="http://schemas.microsoft.com/office/powerpoint/2010/main" xmlns="" val="4294963567"/>
+        <p14:creationId xmlns="" xmlns:p14="http://schemas.microsoft.com/office/powerpoint/2010/main" val="4294963567"/>
       </p:ext>
     </p:extLst>
   </p:cSld>
@@ -4688,7 +4720,7 @@
           <p:cNvPr id="7" name="Subtítulo 2">
             <a:extLst>
               <a:ext uri="{FF2B5EF4-FFF2-40B4-BE49-F238E27FC236}">
-                <a16:creationId xmlns:a16="http://schemas.microsoft.com/office/drawing/2014/main" xmlns="" id="{E9306B26-74AD-604D-A293-40BC4D1A7E9D}"/>
+                <a16:creationId xmlns="" xmlns:a16="http://schemas.microsoft.com/office/drawing/2014/main" id="{E9306B26-74AD-604D-A293-40BC4D1A7E9D}"/>
               </a:ext>
             </a:extLst>
           </p:cNvPr>
@@ -4827,7 +4859,7 @@
     </p:spTree>
     <p:extLst>
       <p:ext uri="{BB962C8B-B14F-4D97-AF65-F5344CB8AC3E}">
-        <p14:creationId xmlns:p14="http://schemas.microsoft.com/office/powerpoint/2010/main" xmlns="" val="4294963567"/>
+        <p14:creationId xmlns="" xmlns:p14="http://schemas.microsoft.com/office/powerpoint/2010/main" val="4294963567"/>
       </p:ext>
     </p:extLst>
   </p:cSld>
@@ -4996,25 +5028,7 @@
               <a:rPr lang="pt-BR" dirty="0" smtClean="0">
                 <a:latin typeface="Berlin Sans FB" panose="020E0602020502020306" pitchFamily="34" charset="0"/>
               </a:rPr>
-              <a:t>Protótipo desenvolvido no </a:t>
-            </a:r>
-            <a:r>
-              <a:rPr lang="pt-BR" dirty="0" smtClean="0">
-                <a:latin typeface="Berlin Sans FB" panose="020E0602020502020306" pitchFamily="34" charset="0"/>
-              </a:rPr>
-              <a:t>Figma</a:t>
-            </a:r>
-            <a:r>
-              <a:rPr lang="pt-BR" dirty="0" smtClean="0">
-                <a:latin typeface="Berlin Sans FB" panose="020E0602020502020306" pitchFamily="34" charset="0"/>
-              </a:rPr>
-              <a:t> </a:t>
-            </a:r>
-            <a:r>
-              <a:rPr lang="pt-BR" dirty="0" smtClean="0">
-                <a:latin typeface="Berlin Sans FB" panose="020E0602020502020306" pitchFamily="34" charset="0"/>
-              </a:rPr>
-              <a:t>e responsivo.</a:t>
+              <a:t>Protótipo desenvolvido no Figma e responsivo.</a:t>
             </a:r>
             <a:endParaRPr lang="pt-BR" dirty="0">
               <a:latin typeface="Berlin Sans FB" panose="020E0602020502020306" pitchFamily="34" charset="0"/>
@@ -5057,7 +5071,7 @@
     </p:spTree>
     <p:extLst>
       <p:ext uri="{BB962C8B-B14F-4D97-AF65-F5344CB8AC3E}">
-        <p14:creationId xmlns:p14="http://schemas.microsoft.com/office/powerpoint/2010/main" xmlns="" val="4294963567"/>
+        <p14:creationId xmlns="" xmlns:p14="http://schemas.microsoft.com/office/powerpoint/2010/main" val="4294963567"/>
       </p:ext>
     </p:extLst>
   </p:cSld>
@@ -5284,7 +5298,7 @@
       </p:sp>
       <p:pic>
         <p:nvPicPr>
-          <p:cNvPr id="2050" name="Picture 2"/>
+          <p:cNvPr id="2051" name="Picture 3"/>
           <p:cNvPicPr>
             <a:picLocks noChangeAspect="1" noChangeArrowheads="1"/>
           </p:cNvPicPr>
@@ -5299,8 +5313,8 @@
         </p:blipFill>
         <p:spPr bwMode="auto">
           <a:xfrm>
-            <a:off x="5192110" y="1148091"/>
-            <a:ext cx="6605260" cy="1556047"/>
+            <a:off x="5213295" y="3693402"/>
+            <a:ext cx="5591175" cy="2266950"/>
           </a:xfrm>
           <a:prstGeom prst="rect">
             <a:avLst/>
@@ -5316,7 +5330,7 @@
       </p:pic>
       <p:pic>
         <p:nvPicPr>
-          <p:cNvPr id="2051" name="Picture 3"/>
+          <p:cNvPr id="2" name="Picture 2"/>
           <p:cNvPicPr>
             <a:picLocks noChangeAspect="1" noChangeArrowheads="1"/>
           </p:cNvPicPr>
@@ -5331,8 +5345,8 @@
         </p:blipFill>
         <p:spPr bwMode="auto">
           <a:xfrm>
-            <a:off x="5213295" y="3693402"/>
-            <a:ext cx="5591175" cy="2266950"/>
+            <a:off x="5155967" y="1392142"/>
+            <a:ext cx="6712169" cy="1490166"/>
           </a:xfrm>
           <a:prstGeom prst="rect">
             <a:avLst/>
@@ -5349,7 +5363,7 @@
     </p:spTree>
     <p:extLst>
       <p:ext uri="{BB962C8B-B14F-4D97-AF65-F5344CB8AC3E}">
-        <p14:creationId xmlns:p14="http://schemas.microsoft.com/office/powerpoint/2010/main" xmlns="" val="4294963567"/>
+        <p14:creationId xmlns="" xmlns:p14="http://schemas.microsoft.com/office/powerpoint/2010/main" val="4294963567"/>
       </p:ext>
     </p:extLst>
   </p:cSld>
@@ -5535,7 +5549,7 @@
     </p:spTree>
     <p:extLst>
       <p:ext uri="{BB962C8B-B14F-4D97-AF65-F5344CB8AC3E}">
-        <p14:creationId xmlns:p14="http://schemas.microsoft.com/office/powerpoint/2010/main" xmlns="" val="4294963567"/>
+        <p14:creationId xmlns="" xmlns:p14="http://schemas.microsoft.com/office/powerpoint/2010/main" val="4294963567"/>
       </p:ext>
     </p:extLst>
   </p:cSld>
@@ -5678,13 +5692,7 @@
               <a:rPr lang="pt-BR" dirty="0" smtClean="0">
                 <a:latin typeface="Berlin Sans FB" panose="020E0602020502020306" pitchFamily="34" charset="0"/>
               </a:rPr>
-              <a:t>, favoritos, sac</a:t>
-            </a:r>
-            <a:r>
-              <a:rPr lang="pt-BR" dirty="0" smtClean="0">
-                <a:latin typeface="Berlin Sans FB" panose="020E0602020502020306" pitchFamily="34" charset="0"/>
-              </a:rPr>
-              <a:t>.</a:t>
+              <a:t>, favoritos, sac.</a:t>
             </a:r>
             <a:endParaRPr lang="pt-BR" dirty="0">
               <a:latin typeface="Berlin Sans FB" panose="020E0602020502020306" pitchFamily="34" charset="0"/>
@@ -5777,7 +5785,7 @@
     </p:spTree>
     <p:extLst>
       <p:ext uri="{BB962C8B-B14F-4D97-AF65-F5344CB8AC3E}">
-        <p14:creationId xmlns:p14="http://schemas.microsoft.com/office/powerpoint/2010/main" xmlns="" val="4294963567"/>
+        <p14:creationId xmlns="" xmlns:p14="http://schemas.microsoft.com/office/powerpoint/2010/main" val="4294963567"/>
       </p:ext>
     </p:extLst>
   </p:cSld>
@@ -5951,7 +5959,7 @@
     </p:spTree>
     <p:extLst>
       <p:ext uri="{BB962C8B-B14F-4D97-AF65-F5344CB8AC3E}">
-        <p14:creationId xmlns:p14="http://schemas.microsoft.com/office/powerpoint/2010/main" xmlns="" val="4294963567"/>
+        <p14:creationId xmlns="" xmlns:p14="http://schemas.microsoft.com/office/powerpoint/2010/main" val="4294963567"/>
       </p:ext>
     </p:extLst>
   </p:cSld>
@@ -6157,7 +6165,7 @@
     </p:spTree>
     <p:extLst>
       <p:ext uri="{BB962C8B-B14F-4D97-AF65-F5344CB8AC3E}">
-        <p14:creationId xmlns:p14="http://schemas.microsoft.com/office/powerpoint/2010/main" xmlns="" val="4294963567"/>
+        <p14:creationId xmlns="" xmlns:p14="http://schemas.microsoft.com/office/powerpoint/2010/main" val="4294963567"/>
       </p:ext>
     </p:extLst>
   </p:cSld>
@@ -6343,7 +6351,7 @@
     </p:spTree>
     <p:extLst>
       <p:ext uri="{BB962C8B-B14F-4D97-AF65-F5344CB8AC3E}">
-        <p14:creationId xmlns:p14="http://schemas.microsoft.com/office/powerpoint/2010/main" xmlns="" val="4294963567"/>
+        <p14:creationId xmlns="" xmlns:p14="http://schemas.microsoft.com/office/powerpoint/2010/main" val="4294963567"/>
       </p:ext>
     </p:extLst>
   </p:cSld>
@@ -6573,7 +6581,7 @@
     </p:spTree>
     <p:extLst>
       <p:ext uri="{BB962C8B-B14F-4D97-AF65-F5344CB8AC3E}">
-        <p14:creationId xmlns:p14="http://schemas.microsoft.com/office/powerpoint/2010/main" xmlns="" val="4294963567"/>
+        <p14:creationId xmlns="" xmlns:p14="http://schemas.microsoft.com/office/powerpoint/2010/main" val="4294963567"/>
       </p:ext>
     </p:extLst>
   </p:cSld>
@@ -6845,7 +6853,7 @@
   <a:extraClrSchemeLst/>
   <a:extLst>
     <a:ext uri="{05A4C25C-085E-4340-85A3-A5531E510DB2}">
-      <thm15:themeFamily xmlns:thm15="http://schemas.microsoft.com/office/thememl/2012/main" xmlns="" name="Office Theme" id="{62F939B6-93AF-4DB8-9C6B-D6C7DFDC589F}" vid="{4A3C46E8-61CC-4603-A589-7422A47A8E4A}"/>
+      <thm15:themeFamily xmlns="" xmlns:thm15="http://schemas.microsoft.com/office/thememl/2012/main" name="Office Theme" id="{62F939B6-93AF-4DB8-9C6B-D6C7DFDC589F}" vid="{4A3C46E8-61CC-4603-A589-7422A47A8E4A}"/>
     </a:ext>
   </a:extLst>
 </a:theme>
@@ -7106,7 +7114,7 @@
   <a:extraClrSchemeLst/>
   <a:extLst>
     <a:ext uri="{05A4C25C-085E-4340-85A3-A5531E510DB2}">
-      <thm15:themeFamily xmlns:thm15="http://schemas.microsoft.com/office/thememl/2012/main" xmlns="" name="Office Theme" id="{62F939B6-93AF-4DB8-9C6B-D6C7DFDC589F}" vid="{4A3C46E8-61CC-4603-A589-7422A47A8E4A}"/>
+      <thm15:themeFamily xmlns="" xmlns:thm15="http://schemas.microsoft.com/office/thememl/2012/main" name="Office Theme" id="{62F939B6-93AF-4DB8-9C6B-D6C7DFDC589F}" vid="{4A3C46E8-61CC-4603-A589-7422A47A8E4A}"/>
     </a:ext>
   </a:extLst>
 </a:theme>

</xml_diff>

<commit_message>
Atualização documentação game mania
</commit_message>
<xml_diff>
--- a/UC09_Codificação_para_Front_End/SA2 - Encontro Remoto 5/GameMania_Vander.pptx
+++ b/UC09_Codificação_para_Front_End/SA2 - Encontro Remoto 5/GameMania_Vander.pptx
@@ -123,7 +123,7 @@
   </p:defaultTextStyle>
   <p:extLst>
     <p:ext uri="{EFAFB233-063F-42B5-8137-9DF3F51BA10A}">
-      <p15:sldGuideLst xmlns="" xmlns:p15="http://schemas.microsoft.com/office/powerpoint/2012/main"/>
+      <p15:sldGuideLst xmlns:p15="http://schemas.microsoft.com/office/powerpoint/2012/main" xmlns=""/>
     </p:ext>
   </p:extLst>
 </p:presentation>
@@ -381,7 +381,7 @@
     </p:spTree>
     <p:extLst>
       <p:ext uri="{BB962C8B-B14F-4D97-AF65-F5344CB8AC3E}">
-        <p14:creationId xmlns="" xmlns:p14="http://schemas.microsoft.com/office/powerpoint/2010/main" val="1960856101"/>
+        <p14:creationId xmlns:p14="http://schemas.microsoft.com/office/powerpoint/2010/main" xmlns="" val="1960856101"/>
       </p:ext>
     </p:extLst>
   </p:cSld>
@@ -665,7 +665,7 @@
     </p:spTree>
     <p:extLst>
       <p:ext uri="{BB962C8B-B14F-4D97-AF65-F5344CB8AC3E}">
-        <p14:creationId xmlns="" xmlns:p14="http://schemas.microsoft.com/office/powerpoint/2010/main" val="3260979146"/>
+        <p14:creationId xmlns:p14="http://schemas.microsoft.com/office/powerpoint/2010/main" xmlns="" val="3260979146"/>
       </p:ext>
     </p:extLst>
   </p:cSld>
@@ -837,7 +837,7 @@
     </p:spTree>
     <p:extLst>
       <p:ext uri="{BB962C8B-B14F-4D97-AF65-F5344CB8AC3E}">
-        <p14:creationId xmlns="" xmlns:p14="http://schemas.microsoft.com/office/powerpoint/2010/main" val="1798534047"/>
+        <p14:creationId xmlns:p14="http://schemas.microsoft.com/office/powerpoint/2010/main" xmlns="" val="1798534047"/>
       </p:ext>
     </p:extLst>
   </p:cSld>
@@ -1019,7 +1019,7 @@
     </p:spTree>
     <p:extLst>
       <p:ext uri="{BB962C8B-B14F-4D97-AF65-F5344CB8AC3E}">
-        <p14:creationId xmlns="" xmlns:p14="http://schemas.microsoft.com/office/powerpoint/2010/main" val="2406611249"/>
+        <p14:creationId xmlns:p14="http://schemas.microsoft.com/office/powerpoint/2010/main" xmlns="" val="2406611249"/>
       </p:ext>
     </p:extLst>
   </p:cSld>
@@ -1191,7 +1191,7 @@
     </p:spTree>
     <p:extLst>
       <p:ext uri="{BB962C8B-B14F-4D97-AF65-F5344CB8AC3E}">
-        <p14:creationId xmlns="" xmlns:p14="http://schemas.microsoft.com/office/powerpoint/2010/main" val="3805568220"/>
+        <p14:creationId xmlns:p14="http://schemas.microsoft.com/office/powerpoint/2010/main" xmlns="" val="3805568220"/>
       </p:ext>
     </p:extLst>
   </p:cSld>
@@ -1439,7 +1439,7 @@
     </p:spTree>
     <p:extLst>
       <p:ext uri="{BB962C8B-B14F-4D97-AF65-F5344CB8AC3E}">
-        <p14:creationId xmlns="" xmlns:p14="http://schemas.microsoft.com/office/powerpoint/2010/main" val="2250747918"/>
+        <p14:creationId xmlns:p14="http://schemas.microsoft.com/office/powerpoint/2010/main" xmlns="" val="2250747918"/>
       </p:ext>
     </p:extLst>
   </p:cSld>
@@ -1673,7 +1673,7 @@
     </p:spTree>
     <p:extLst>
       <p:ext uri="{BB962C8B-B14F-4D97-AF65-F5344CB8AC3E}">
-        <p14:creationId xmlns="" xmlns:p14="http://schemas.microsoft.com/office/powerpoint/2010/main" val="2223235357"/>
+        <p14:creationId xmlns:p14="http://schemas.microsoft.com/office/powerpoint/2010/main" xmlns="" val="2223235357"/>
       </p:ext>
     </p:extLst>
   </p:cSld>
@@ -2042,7 +2042,7 @@
     </p:spTree>
     <p:extLst>
       <p:ext uri="{BB962C8B-B14F-4D97-AF65-F5344CB8AC3E}">
-        <p14:creationId xmlns="" xmlns:p14="http://schemas.microsoft.com/office/powerpoint/2010/main" val="3629131634"/>
+        <p14:creationId xmlns:p14="http://schemas.microsoft.com/office/powerpoint/2010/main" xmlns="" val="3629131634"/>
       </p:ext>
     </p:extLst>
   </p:cSld>
@@ -2162,7 +2162,7 @@
     </p:spTree>
     <p:extLst>
       <p:ext uri="{BB962C8B-B14F-4D97-AF65-F5344CB8AC3E}">
-        <p14:creationId xmlns="" xmlns:p14="http://schemas.microsoft.com/office/powerpoint/2010/main" val="1595217743"/>
+        <p14:creationId xmlns:p14="http://schemas.microsoft.com/office/powerpoint/2010/main" xmlns="" val="1595217743"/>
       </p:ext>
     </p:extLst>
   </p:cSld>
@@ -2259,7 +2259,7 @@
     </p:spTree>
     <p:extLst>
       <p:ext uri="{BB962C8B-B14F-4D97-AF65-F5344CB8AC3E}">
-        <p14:creationId xmlns="" xmlns:p14="http://schemas.microsoft.com/office/powerpoint/2010/main" val="259170255"/>
+        <p14:creationId xmlns:p14="http://schemas.microsoft.com/office/powerpoint/2010/main" xmlns="" val="259170255"/>
       </p:ext>
     </p:extLst>
   </p:cSld>
@@ -2538,7 +2538,7 @@
     </p:spTree>
     <p:extLst>
       <p:ext uri="{BB962C8B-B14F-4D97-AF65-F5344CB8AC3E}">
-        <p14:creationId xmlns="" xmlns:p14="http://schemas.microsoft.com/office/powerpoint/2010/main" val="1811955283"/>
+        <p14:creationId xmlns:p14="http://schemas.microsoft.com/office/powerpoint/2010/main" xmlns="" val="1811955283"/>
       </p:ext>
     </p:extLst>
   </p:cSld>
@@ -2793,7 +2793,7 @@
     </p:spTree>
     <p:extLst>
       <p:ext uri="{BB962C8B-B14F-4D97-AF65-F5344CB8AC3E}">
-        <p14:creationId xmlns="" xmlns:p14="http://schemas.microsoft.com/office/powerpoint/2010/main" val="1253327629"/>
+        <p14:creationId xmlns:p14="http://schemas.microsoft.com/office/powerpoint/2010/main" xmlns="" val="1253327629"/>
       </p:ext>
     </p:extLst>
   </p:cSld>
@@ -3054,7 +3054,7 @@
     </p:spTree>
     <p:extLst>
       <p:ext uri="{BB962C8B-B14F-4D97-AF65-F5344CB8AC3E}">
-        <p14:creationId xmlns="" xmlns:p14="http://schemas.microsoft.com/office/powerpoint/2010/main" val="963955141"/>
+        <p14:creationId xmlns:p14="http://schemas.microsoft.com/office/powerpoint/2010/main" xmlns="" val="963955141"/>
       </p:ext>
     </p:extLst>
   </p:cSld>
@@ -3385,7 +3385,7 @@
           <p:cNvPr id="11" name="Título 1">
             <a:extLst>
               <a:ext uri="{FF2B5EF4-FFF2-40B4-BE49-F238E27FC236}">
-                <a16:creationId xmlns="" xmlns:a16="http://schemas.microsoft.com/office/drawing/2014/main" id="{AF25BD60-B88F-9418-7C60-522002041711}"/>
+                <a16:creationId xmlns:a16="http://schemas.microsoft.com/office/drawing/2014/main" xmlns="" id="{AF25BD60-B88F-9418-7C60-522002041711}"/>
               </a:ext>
             </a:extLst>
           </p:cNvPr>
@@ -3510,7 +3510,7 @@
           <p:cNvPr id="12" name="Subtítulo 2">
             <a:extLst>
               <a:ext uri="{FF2B5EF4-FFF2-40B4-BE49-F238E27FC236}">
-                <a16:creationId xmlns="" xmlns:a16="http://schemas.microsoft.com/office/drawing/2014/main" id="{E9306B26-74AD-604D-A293-40BC4D1A7E9D}"/>
+                <a16:creationId xmlns:a16="http://schemas.microsoft.com/office/drawing/2014/main" xmlns="" id="{E9306B26-74AD-604D-A293-40BC4D1A7E9D}"/>
               </a:ext>
             </a:extLst>
           </p:cNvPr>
@@ -3649,7 +3649,7 @@
     </p:spTree>
     <p:extLst>
       <p:ext uri="{BB962C8B-B14F-4D97-AF65-F5344CB8AC3E}">
-        <p14:creationId xmlns="" xmlns:p14="http://schemas.microsoft.com/office/powerpoint/2010/main" val="4294963567"/>
+        <p14:creationId xmlns:p14="http://schemas.microsoft.com/office/powerpoint/2010/main" xmlns="" val="4294963567"/>
       </p:ext>
     </p:extLst>
   </p:cSld>
@@ -3823,7 +3823,7 @@
     </p:spTree>
     <p:extLst>
       <p:ext uri="{BB962C8B-B14F-4D97-AF65-F5344CB8AC3E}">
-        <p14:creationId xmlns="" xmlns:p14="http://schemas.microsoft.com/office/powerpoint/2010/main" val="4294963567"/>
+        <p14:creationId xmlns:p14="http://schemas.microsoft.com/office/powerpoint/2010/main" xmlns="" val="4294963567"/>
       </p:ext>
     </p:extLst>
   </p:cSld>
@@ -4018,7 +4018,7 @@
     </p:spTree>
     <p:extLst>
       <p:ext uri="{BB962C8B-B14F-4D97-AF65-F5344CB8AC3E}">
-        <p14:creationId xmlns="" xmlns:p14="http://schemas.microsoft.com/office/powerpoint/2010/main" val="4294963567"/>
+        <p14:creationId xmlns:p14="http://schemas.microsoft.com/office/powerpoint/2010/main" xmlns="" val="4294963567"/>
       </p:ext>
     </p:extLst>
   </p:cSld>
@@ -4213,7 +4213,7 @@
     </p:spTree>
     <p:extLst>
       <p:ext uri="{BB962C8B-B14F-4D97-AF65-F5344CB8AC3E}">
-        <p14:creationId xmlns="" xmlns:p14="http://schemas.microsoft.com/office/powerpoint/2010/main" val="4294963567"/>
+        <p14:creationId xmlns:p14="http://schemas.microsoft.com/office/powerpoint/2010/main" xmlns="" val="4294963567"/>
       </p:ext>
     </p:extLst>
   </p:cSld>
@@ -4399,7 +4399,7 @@
     </p:spTree>
     <p:extLst>
       <p:ext uri="{BB962C8B-B14F-4D97-AF65-F5344CB8AC3E}">
-        <p14:creationId xmlns="" xmlns:p14="http://schemas.microsoft.com/office/powerpoint/2010/main" val="4294963567"/>
+        <p14:creationId xmlns:p14="http://schemas.microsoft.com/office/powerpoint/2010/main" xmlns="" val="4294963567"/>
       </p:ext>
     </p:extLst>
   </p:cSld>
@@ -4617,7 +4617,7 @@
     </p:spTree>
     <p:extLst>
       <p:ext uri="{BB962C8B-B14F-4D97-AF65-F5344CB8AC3E}">
-        <p14:creationId xmlns="" xmlns:p14="http://schemas.microsoft.com/office/powerpoint/2010/main" val="4294963567"/>
+        <p14:creationId xmlns:p14="http://schemas.microsoft.com/office/powerpoint/2010/main" xmlns="" val="4294963567"/>
       </p:ext>
     </p:extLst>
   </p:cSld>
@@ -4720,7 +4720,7 @@
           <p:cNvPr id="7" name="Subtítulo 2">
             <a:extLst>
               <a:ext uri="{FF2B5EF4-FFF2-40B4-BE49-F238E27FC236}">
-                <a16:creationId xmlns="" xmlns:a16="http://schemas.microsoft.com/office/drawing/2014/main" id="{E9306B26-74AD-604D-A293-40BC4D1A7E9D}"/>
+                <a16:creationId xmlns:a16="http://schemas.microsoft.com/office/drawing/2014/main" xmlns="" id="{E9306B26-74AD-604D-A293-40BC4D1A7E9D}"/>
               </a:ext>
             </a:extLst>
           </p:cNvPr>
@@ -4859,7 +4859,7 @@
     </p:spTree>
     <p:extLst>
       <p:ext uri="{BB962C8B-B14F-4D97-AF65-F5344CB8AC3E}">
-        <p14:creationId xmlns="" xmlns:p14="http://schemas.microsoft.com/office/powerpoint/2010/main" val="4294963567"/>
+        <p14:creationId xmlns:p14="http://schemas.microsoft.com/office/powerpoint/2010/main" xmlns="" val="4294963567"/>
       </p:ext>
     </p:extLst>
   </p:cSld>
@@ -5071,7 +5071,7 @@
     </p:spTree>
     <p:extLst>
       <p:ext uri="{BB962C8B-B14F-4D97-AF65-F5344CB8AC3E}">
-        <p14:creationId xmlns="" xmlns:p14="http://schemas.microsoft.com/office/powerpoint/2010/main" val="4294963567"/>
+        <p14:creationId xmlns:p14="http://schemas.microsoft.com/office/powerpoint/2010/main" xmlns="" val="4294963567"/>
       </p:ext>
     </p:extLst>
   </p:cSld>
@@ -5363,7 +5363,7 @@
     </p:spTree>
     <p:extLst>
       <p:ext uri="{BB962C8B-B14F-4D97-AF65-F5344CB8AC3E}">
-        <p14:creationId xmlns="" xmlns:p14="http://schemas.microsoft.com/office/powerpoint/2010/main" val="4294963567"/>
+        <p14:creationId xmlns:p14="http://schemas.microsoft.com/office/powerpoint/2010/main" xmlns="" val="4294963567"/>
       </p:ext>
     </p:extLst>
   </p:cSld>
@@ -5549,7 +5549,7 @@
     </p:spTree>
     <p:extLst>
       <p:ext uri="{BB962C8B-B14F-4D97-AF65-F5344CB8AC3E}">
-        <p14:creationId xmlns="" xmlns:p14="http://schemas.microsoft.com/office/powerpoint/2010/main" val="4294963567"/>
+        <p14:creationId xmlns:p14="http://schemas.microsoft.com/office/powerpoint/2010/main" xmlns="" val="4294963567"/>
       </p:ext>
     </p:extLst>
   </p:cSld>
@@ -5752,7 +5752,7 @@
       </p:sp>
       <p:pic>
         <p:nvPicPr>
-          <p:cNvPr id="4101" name="Picture 5"/>
+          <p:cNvPr id="1026" name="Picture 2"/>
           <p:cNvPicPr>
             <a:picLocks noChangeAspect="1" noChangeArrowheads="1"/>
           </p:cNvPicPr>
@@ -5767,8 +5767,8 @@
         </p:blipFill>
         <p:spPr bwMode="auto">
           <a:xfrm>
-            <a:off x="561870" y="1715408"/>
-            <a:ext cx="11157809" cy="1404534"/>
+            <a:off x="0" y="1454916"/>
+            <a:ext cx="12213744" cy="1351345"/>
           </a:xfrm>
           <a:prstGeom prst="rect">
             <a:avLst/>
@@ -5785,7 +5785,7 @@
     </p:spTree>
     <p:extLst>
       <p:ext uri="{BB962C8B-B14F-4D97-AF65-F5344CB8AC3E}">
-        <p14:creationId xmlns="" xmlns:p14="http://schemas.microsoft.com/office/powerpoint/2010/main" val="4294963567"/>
+        <p14:creationId xmlns:p14="http://schemas.microsoft.com/office/powerpoint/2010/main" xmlns="" val="4294963567"/>
       </p:ext>
     </p:extLst>
   </p:cSld>
@@ -5959,7 +5959,7 @@
     </p:spTree>
     <p:extLst>
       <p:ext uri="{BB962C8B-B14F-4D97-AF65-F5344CB8AC3E}">
-        <p14:creationId xmlns="" xmlns:p14="http://schemas.microsoft.com/office/powerpoint/2010/main" val="4294963567"/>
+        <p14:creationId xmlns:p14="http://schemas.microsoft.com/office/powerpoint/2010/main" xmlns="" val="4294963567"/>
       </p:ext>
     </p:extLst>
   </p:cSld>
@@ -6165,7 +6165,7 @@
     </p:spTree>
     <p:extLst>
       <p:ext uri="{BB962C8B-B14F-4D97-AF65-F5344CB8AC3E}">
-        <p14:creationId xmlns="" xmlns:p14="http://schemas.microsoft.com/office/powerpoint/2010/main" val="4294963567"/>
+        <p14:creationId xmlns:p14="http://schemas.microsoft.com/office/powerpoint/2010/main" xmlns="" val="4294963567"/>
       </p:ext>
     </p:extLst>
   </p:cSld>
@@ -6351,7 +6351,7 @@
     </p:spTree>
     <p:extLst>
       <p:ext uri="{BB962C8B-B14F-4D97-AF65-F5344CB8AC3E}">
-        <p14:creationId xmlns="" xmlns:p14="http://schemas.microsoft.com/office/powerpoint/2010/main" val="4294963567"/>
+        <p14:creationId xmlns:p14="http://schemas.microsoft.com/office/powerpoint/2010/main" xmlns="" val="4294963567"/>
       </p:ext>
     </p:extLst>
   </p:cSld>
@@ -6581,7 +6581,7 @@
     </p:spTree>
     <p:extLst>
       <p:ext uri="{BB962C8B-B14F-4D97-AF65-F5344CB8AC3E}">
-        <p14:creationId xmlns="" xmlns:p14="http://schemas.microsoft.com/office/powerpoint/2010/main" val="4294963567"/>
+        <p14:creationId xmlns:p14="http://schemas.microsoft.com/office/powerpoint/2010/main" xmlns="" val="4294963567"/>
       </p:ext>
     </p:extLst>
   </p:cSld>
@@ -6853,7 +6853,7 @@
   <a:extraClrSchemeLst/>
   <a:extLst>
     <a:ext uri="{05A4C25C-085E-4340-85A3-A5531E510DB2}">
-      <thm15:themeFamily xmlns="" xmlns:thm15="http://schemas.microsoft.com/office/thememl/2012/main" name="Office Theme" id="{62F939B6-93AF-4DB8-9C6B-D6C7DFDC589F}" vid="{4A3C46E8-61CC-4603-A589-7422A47A8E4A}"/>
+      <thm15:themeFamily xmlns:thm15="http://schemas.microsoft.com/office/thememl/2012/main" xmlns="" name="Office Theme" id="{62F939B6-93AF-4DB8-9C6B-D6C7DFDC589F}" vid="{4A3C46E8-61CC-4603-A589-7422A47A8E4A}"/>
     </a:ext>
   </a:extLst>
 </a:theme>
@@ -7114,7 +7114,7 @@
   <a:extraClrSchemeLst/>
   <a:extLst>
     <a:ext uri="{05A4C25C-085E-4340-85A3-A5531E510DB2}">
-      <thm15:themeFamily xmlns="" xmlns:thm15="http://schemas.microsoft.com/office/thememl/2012/main" name="Office Theme" id="{62F939B6-93AF-4DB8-9C6B-D6C7DFDC589F}" vid="{4A3C46E8-61CC-4603-A589-7422A47A8E4A}"/>
+      <thm15:themeFamily xmlns:thm15="http://schemas.microsoft.com/office/thememl/2012/main" xmlns="" name="Office Theme" id="{62F939B6-93AF-4DB8-9C6B-D6C7DFDC589F}" vid="{4A3C46E8-61CC-4603-A589-7422A47A8E4A}"/>
     </a:ext>
   </a:extLst>
 </a:theme>

</xml_diff>